<commit_message>
#1 - update to include draft status on deck
</commit_message>
<xml_diff>
--- a/Digital Task Force - Introduction - long form.pptx
+++ b/Digital Task Force - Introduction - long form.pptx
@@ -3076,7 +3076,7 @@
         <p:spPr>
           <a:xfrm>
             <a:off x="3205843" y="3879669"/>
-            <a:ext cx="5780315" cy="369332"/>
+            <a:ext cx="5780315" cy="461665"/>
           </a:xfrm>
           <a:prstGeom prst="rect">
             <a:avLst/>
@@ -3091,10 +3091,48 @@
           <a:p>
             <a:pPr algn="ctr"/>
             <a:r>
-              <a:rPr lang="en-US" dirty="0" smtClean="0"/>
+              <a:rPr lang="en-US" sz="2400" dirty="0" smtClean="0"/>
               <a:t>Who are we and what are we trying to do?</a:t>
             </a:r>
-            <a:endParaRPr lang="en-CA" dirty="0"/>
+            <a:endParaRPr lang="en-CA" sz="2400" dirty="0"/>
+          </a:p>
+        </p:txBody>
+      </p:sp>
+      <p:sp>
+        <p:nvSpPr>
+          <p:cNvPr id="5" name="TextBox 4"/>
+          <p:cNvSpPr txBox="1"/>
+          <p:nvPr/>
+        </p:nvSpPr>
+        <p:spPr>
+          <a:xfrm>
+            <a:off x="174171" y="348343"/>
+            <a:ext cx="4545875" cy="830997"/>
+          </a:xfrm>
+          <a:prstGeom prst="rect">
+            <a:avLst/>
+          </a:prstGeom>
+          <a:noFill/>
+        </p:spPr>
+        <p:txBody>
+          <a:bodyPr wrap="square" rtlCol="0">
+            <a:spAutoFit/>
+          </a:bodyPr>
+          <a:lstStyle/>
+          <a:p>
+            <a:r>
+              <a:rPr lang="en-US" sz="4800" dirty="0" smtClean="0">
+                <a:solidFill>
+                  <a:srgbClr val="FF0000"/>
+                </a:solidFill>
+              </a:rPr>
+              <a:t>[DRAFT]</a:t>
+            </a:r>
+            <a:endParaRPr lang="en-CA" sz="4800" dirty="0">
+              <a:solidFill>
+                <a:srgbClr val="FF0000"/>
+              </a:solidFill>
+            </a:endParaRPr>
           </a:p>
         </p:txBody>
       </p:sp>
@@ -5263,16 +5301,7 @@
                 </a:solidFill>
                 <a:latin typeface="Consolas" panose="020B0609020204030204" pitchFamily="49" charset="0"/>
               </a:rPr>
-              <a:t>Uniquely </a:t>
-            </a:r>
-            <a:r>
-              <a:rPr lang="en-US" sz="2400" dirty="0" smtClean="0">
-                <a:solidFill>
-                  <a:schemeClr val="bg2"/>
-                </a:solidFill>
-                <a:latin typeface="Consolas" panose="020B0609020204030204" pitchFamily="49" charset="0"/>
-              </a:rPr>
-              <a:t>skilled public servants that can move freely around the organization as needed both as a team, or individually</a:t>
+              <a:t>Uniquely skilled public servants that can move freely around the organization as needed both as a team, or individually</a:t>
             </a:r>
           </a:p>
         </p:txBody>
@@ -5358,19 +5387,7 @@
                 <a:rPr lang="en-US" sz="1400" b="1" dirty="0" smtClean="0">
                   <a:latin typeface="Consolas" panose="020B0609020204030204" pitchFamily="49" charset="0"/>
                 </a:rPr>
-                <a:t>[CANADAS </a:t>
-              </a:r>
-              <a:r>
-                <a:rPr lang="en-US" sz="1400" b="1" dirty="0" smtClean="0">
-                  <a:latin typeface="Consolas" panose="020B0609020204030204" pitchFamily="49" charset="0"/>
-                </a:rPr>
-                <a:t>FREE AGENTS</a:t>
-              </a:r>
-              <a:r>
-                <a:rPr lang="en-US" sz="1400" b="1" dirty="0" smtClean="0">
-                  <a:latin typeface="Consolas" panose="020B0609020204030204" pitchFamily="49" charset="0"/>
-                </a:rPr>
-                <a:t>]</a:t>
+                <a:t>[CANADAS FREE AGENTS]</a:t>
               </a:r>
             </a:p>
             <a:p>
@@ -5625,9 +5642,6 @@
               </a:rPr>
               <a:t>will focus on improving our ability to deliver digital services, across all disciplines.</a:t>
             </a:r>
-            <a:endParaRPr lang="en-US" sz="1200" dirty="0">
-              <a:latin typeface="Consolas" panose="020B0609020204030204" pitchFamily="49" charset="0"/>
-            </a:endParaRPr>
           </a:p>
         </p:txBody>
       </p:sp>
@@ -5688,9 +5702,6 @@
               </a:rPr>
               <a:t>[MISSIONS] </a:t>
             </a:r>
-            <a:endParaRPr lang="en-US" sz="2400" b="1" dirty="0">
-              <a:latin typeface="Consolas" panose="020B0609020204030204" pitchFamily="49" charset="0"/>
-            </a:endParaRPr>
           </a:p>
         </p:txBody>
       </p:sp>
@@ -7107,8 +7118,11 @@
                 </a:solidFill>
                 <a:latin typeface="Consolas" panose="020B0609020204030204" pitchFamily="49" charset="0"/>
               </a:rPr>
-              <a:t>- </a:t>
-            </a:r>
+              <a:t>- Use Agile/DevOps principles</a:t>
+            </a:r>
+          </a:p>
+          <a:p>
+            <a:pPr algn="just"/>
             <a:r>
               <a:rPr lang="en-US" sz="2000" dirty="0" smtClean="0">
                 <a:solidFill>
@@ -7116,35 +7130,8 @@
                 </a:solidFill>
                 <a:latin typeface="Consolas" panose="020B0609020204030204" pitchFamily="49" charset="0"/>
               </a:rPr>
-              <a:t>Use Agile/DevOps principles</a:t>
-            </a:r>
-          </a:p>
-          <a:p>
-            <a:pPr algn="just"/>
-            <a:r>
-              <a:rPr lang="en-US" sz="2000" dirty="0" smtClean="0">
-                <a:solidFill>
-                  <a:schemeClr val="bg2"/>
-                </a:solidFill>
-                <a:latin typeface="Consolas" panose="020B0609020204030204" pitchFamily="49" charset="0"/>
-              </a:rPr>
-              <a:t>- Work in the </a:t>
-            </a:r>
-            <a:r>
-              <a:rPr lang="en-US" sz="2000" dirty="0" smtClean="0">
-                <a:solidFill>
-                  <a:schemeClr val="bg2"/>
-                </a:solidFill>
-                <a:latin typeface="Consolas" panose="020B0609020204030204" pitchFamily="49" charset="0"/>
-              </a:rPr>
-              <a:t>open/transparency</a:t>
-            </a:r>
-            <a:endParaRPr lang="en-US" sz="2000" dirty="0" smtClean="0">
-              <a:solidFill>
-                <a:schemeClr val="bg2"/>
-              </a:solidFill>
-              <a:latin typeface="Consolas" panose="020B0609020204030204" pitchFamily="49" charset="0"/>
-            </a:endParaRPr>
+              <a:t>- Work in the open/transparency</a:t>
+            </a:r>
           </a:p>
           <a:p>
             <a:pPr algn="just"/>
@@ -7213,16 +7200,7 @@
                 </a:solidFill>
                 <a:latin typeface="Consolas" panose="020B0609020204030204" pitchFamily="49" charset="0"/>
               </a:rPr>
-              <a:t>- </a:t>
-            </a:r>
-            <a:r>
-              <a:rPr lang="en-US" sz="2000" dirty="0" smtClean="0">
-                <a:solidFill>
-                  <a:schemeClr val="bg2"/>
-                </a:solidFill>
-                <a:latin typeface="Consolas" panose="020B0609020204030204" pitchFamily="49" charset="0"/>
-              </a:rPr>
-              <a:t>Recruitment &amp; flexible HR</a:t>
+              <a:t>- Recruitment &amp; flexible HR</a:t>
             </a:r>
             <a:br>
               <a:rPr lang="en-US" sz="2000" dirty="0" smtClean="0">
@@ -7267,23 +7245,8 @@
                 </a:solidFill>
                 <a:latin typeface="Consolas" panose="020B0609020204030204" pitchFamily="49" charset="0"/>
               </a:rPr>
-              <a:t>- </a:t>
-            </a:r>
-            <a:r>
-              <a:rPr lang="en-US" sz="2000" dirty="0" smtClean="0">
-                <a:solidFill>
-                  <a:schemeClr val="bg2"/>
-                </a:solidFill>
-                <a:latin typeface="Consolas" panose="020B0609020204030204" pitchFamily="49" charset="0"/>
-              </a:rPr>
-              <a:t>Trust and collaboration</a:t>
-            </a:r>
-            <a:endParaRPr lang="en-US" sz="2000" dirty="0" smtClean="0">
-              <a:solidFill>
-                <a:schemeClr val="bg2"/>
-              </a:solidFill>
-              <a:latin typeface="Consolas" panose="020B0609020204030204" pitchFamily="49" charset="0"/>
-            </a:endParaRPr>
+              <a:t>- Trust and collaboration</a:t>
+            </a:r>
           </a:p>
         </p:txBody>
       </p:sp>

</xml_diff>

<commit_message>
Minor formatting, punctuation tweaks
</commit_message>
<xml_diff>
--- a/Digital Task Force - Introduction - long form.pptx
+++ b/Digital Task Force - Introduction - long form.pptx
@@ -3035,7 +3035,7 @@
         </p:nvSpPr>
         <p:spPr>
           <a:xfrm>
-            <a:off x="2159849" y="2696346"/>
+            <a:off x="2159849" y="2769662"/>
             <a:ext cx="7593752" cy="830997"/>
           </a:xfrm>
           <a:prstGeom prst="rect">
@@ -3146,6 +3146,13 @@
   <p:clrMapOvr>
     <a:masterClrMapping/>
   </p:clrMapOvr>
+  <p:timing>
+    <p:tnLst>
+      <p:par>
+        <p:cTn id="1" dur="indefinite" restart="never" nodeType="tmRoot"/>
+      </p:par>
+    </p:tnLst>
+  </p:timing>
 </p:sld>
 </file>
 
@@ -3174,7 +3181,7 @@
         </p:nvSpPr>
         <p:spPr>
           <a:xfrm>
-            <a:off x="1479363" y="2592389"/>
+            <a:off x="1036018" y="3091153"/>
             <a:ext cx="9325939" cy="707886"/>
           </a:xfrm>
           <a:prstGeom prst="rect">
@@ -3209,6 +3216,13 @@
   <p:clrMapOvr>
     <a:masterClrMapping/>
   </p:clrMapOvr>
+  <p:timing>
+    <p:tnLst>
+      <p:par>
+        <p:cTn id="1" dur="indefinite" restart="never" nodeType="tmRoot"/>
+      </p:par>
+    </p:tnLst>
+  </p:timing>
 </p:sld>
 </file>
 
@@ -3237,7 +3251,7 @@
         </p:nvSpPr>
         <p:spPr>
           <a:xfrm>
-            <a:off x="0" y="3428824"/>
+            <a:off x="0" y="3373408"/>
             <a:ext cx="12192000" cy="2001795"/>
           </a:xfrm>
           <a:prstGeom prst="rect">
@@ -3282,7 +3296,7 @@
         </p:nvSpPr>
         <p:spPr>
           <a:xfrm>
-            <a:off x="186601" y="116489"/>
+            <a:off x="399185" y="103765"/>
             <a:ext cx="8873544" cy="646331"/>
           </a:xfrm>
           <a:prstGeom prst="rect">
@@ -3316,7 +3330,7 @@
         </p:nvSpPr>
         <p:spPr>
           <a:xfrm>
-            <a:off x="399185" y="1006073"/>
+            <a:off x="399185" y="802346"/>
             <a:ext cx="11449318" cy="954107"/>
           </a:xfrm>
           <a:prstGeom prst="rect">
@@ -3332,6 +3346,9 @@
           <a:p>
             <a:r>
               <a:rPr lang="en-US" sz="2000" b="1" dirty="0" smtClean="0">
+                <a:solidFill>
+                  <a:srgbClr val="0070C0"/>
+                </a:solidFill>
                 <a:latin typeface="Consolas" panose="020B0609020204030204" pitchFamily="49" charset="0"/>
               </a:rPr>
               <a:t>[OBJECTIVE]</a:t>
@@ -3341,7 +3358,10 @@
             <a:r>
               <a:rPr lang="en-US" dirty="0" smtClean="0">
                 <a:solidFill>
-                  <a:schemeClr val="accent5"/>
+                  <a:schemeClr val="tx1">
+                    <a:lumMod val="95000"/>
+                    <a:lumOff val="5000"/>
+                  </a:schemeClr>
                 </a:solidFill>
                 <a:latin typeface="Consolas" panose="020B0609020204030204" pitchFamily="49" charset="0"/>
               </a:rPr>
@@ -3350,7 +3370,10 @@
             <a:r>
               <a:rPr lang="en-US" b="1" dirty="0" smtClean="0">
                 <a:solidFill>
-                  <a:schemeClr val="accent5"/>
+                  <a:schemeClr val="tx1">
+                    <a:lumMod val="95000"/>
+                    <a:lumOff val="5000"/>
+                  </a:schemeClr>
                 </a:solidFill>
                 <a:latin typeface="Consolas" panose="020B0609020204030204" pitchFamily="49" charset="0"/>
               </a:rPr>
@@ -3359,7 +3382,10 @@
             <a:r>
               <a:rPr lang="en-US" dirty="0" smtClean="0">
                 <a:solidFill>
-                  <a:schemeClr val="accent5"/>
+                  <a:schemeClr val="tx1">
+                    <a:lumMod val="95000"/>
+                    <a:lumOff val="5000"/>
+                  </a:schemeClr>
                 </a:solidFill>
                 <a:latin typeface="Consolas" panose="020B0609020204030204" pitchFamily="49" charset="0"/>
               </a:rPr>
@@ -3368,7 +3394,10 @@
             <a:r>
               <a:rPr lang="en-US" b="1" dirty="0" smtClean="0">
                 <a:solidFill>
-                  <a:schemeClr val="accent5"/>
+                  <a:schemeClr val="tx1">
+                    <a:lumMod val="95000"/>
+                    <a:lumOff val="5000"/>
+                  </a:schemeClr>
                 </a:solidFill>
                 <a:latin typeface="Consolas" panose="020B0609020204030204" pitchFamily="49" charset="0"/>
               </a:rPr>
@@ -3377,7 +3406,10 @@
             <a:r>
               <a:rPr lang="en-US" dirty="0" smtClean="0">
                 <a:solidFill>
-                  <a:schemeClr val="accent5"/>
+                  <a:schemeClr val="tx1">
+                    <a:lumMod val="95000"/>
+                    <a:lumOff val="5000"/>
+                  </a:schemeClr>
                 </a:solidFill>
                 <a:latin typeface="Consolas" panose="020B0609020204030204" pitchFamily="49" charset="0"/>
               </a:rPr>
@@ -3385,7 +3417,10 @@
             </a:r>
             <a:endParaRPr lang="en-CA" dirty="0">
               <a:solidFill>
-                <a:schemeClr val="accent5"/>
+                <a:schemeClr val="tx1">
+                  <a:lumMod val="95000"/>
+                  <a:lumOff val="5000"/>
+                </a:schemeClr>
               </a:solidFill>
               <a:latin typeface="Consolas" panose="020B0609020204030204" pitchFamily="49" charset="0"/>
             </a:endParaRPr>
@@ -3400,7 +3435,7 @@
         </p:nvSpPr>
         <p:spPr>
           <a:xfrm>
-            <a:off x="399185" y="5464162"/>
+            <a:off x="399185" y="5556522"/>
             <a:ext cx="3839181" cy="1169551"/>
           </a:xfrm>
           <a:prstGeom prst="rect">
@@ -3416,6 +3451,9 @@
           <a:p>
             <a:r>
               <a:rPr lang="en-US" sz="1400" b="1" dirty="0" smtClean="0">
+                <a:solidFill>
+                  <a:srgbClr val="0070C0"/>
+                </a:solidFill>
                 <a:latin typeface="Consolas" panose="020B0609020204030204" pitchFamily="49" charset="0"/>
               </a:rPr>
               <a:t>[OUR VALUES]</a:t>
@@ -3425,7 +3463,10 @@
             <a:r>
               <a:rPr lang="en-US" sz="1400" dirty="0" smtClean="0">
                 <a:solidFill>
-                  <a:schemeClr val="accent5"/>
+                  <a:schemeClr val="tx1">
+                    <a:lumMod val="95000"/>
+                    <a:lumOff val="5000"/>
+                  </a:schemeClr>
                 </a:solidFill>
                 <a:latin typeface="Consolas" panose="020B0609020204030204" pitchFamily="49" charset="0"/>
               </a:rPr>
@@ -3436,7 +3477,10 @@
             <a:r>
               <a:rPr lang="en-US" sz="1400" dirty="0" smtClean="0">
                 <a:solidFill>
-                  <a:schemeClr val="accent5"/>
+                  <a:schemeClr val="tx1">
+                    <a:lumMod val="95000"/>
+                    <a:lumOff val="5000"/>
+                  </a:schemeClr>
                 </a:solidFill>
                 <a:latin typeface="Consolas" panose="020B0609020204030204" pitchFamily="49" charset="0"/>
               </a:rPr>
@@ -3447,7 +3491,10 @@
             <a:r>
               <a:rPr lang="en-US" sz="1400" dirty="0" smtClean="0">
                 <a:solidFill>
-                  <a:schemeClr val="accent5"/>
+                  <a:schemeClr val="tx1">
+                    <a:lumMod val="95000"/>
+                    <a:lumOff val="5000"/>
+                  </a:schemeClr>
                 </a:solidFill>
                 <a:latin typeface="Consolas" panose="020B0609020204030204" pitchFamily="49" charset="0"/>
               </a:rPr>
@@ -3455,7 +3502,10 @@
             </a:r>
             <a:endParaRPr lang="en-CA" sz="1400" dirty="0" smtClean="0">
               <a:solidFill>
-                <a:schemeClr val="accent5"/>
+                <a:schemeClr val="tx1">
+                  <a:lumMod val="95000"/>
+                  <a:lumOff val="5000"/>
+                </a:schemeClr>
               </a:solidFill>
               <a:latin typeface="Consolas" panose="020B0609020204030204" pitchFamily="49" charset="0"/>
             </a:endParaRPr>
@@ -3464,7 +3514,10 @@
             <a:r>
               <a:rPr lang="en-US" sz="1400" dirty="0" smtClean="0">
                 <a:solidFill>
-                  <a:schemeClr val="accent5"/>
+                  <a:schemeClr val="tx1">
+                    <a:lumMod val="95000"/>
+                    <a:lumOff val="5000"/>
+                  </a:schemeClr>
                 </a:solidFill>
                 <a:latin typeface="Consolas" panose="020B0609020204030204" pitchFamily="49" charset="0"/>
               </a:rPr>
@@ -3472,7 +3525,10 @@
             </a:r>
             <a:endParaRPr lang="en-US" sz="1400" dirty="0">
               <a:solidFill>
-                <a:schemeClr val="accent5"/>
+                <a:schemeClr val="tx1">
+                  <a:lumMod val="95000"/>
+                  <a:lumOff val="5000"/>
+                </a:schemeClr>
               </a:solidFill>
               <a:latin typeface="Consolas" panose="020B0609020204030204" pitchFamily="49" charset="0"/>
             </a:endParaRPr>
@@ -3487,7 +3543,7 @@
         </p:nvSpPr>
         <p:spPr>
           <a:xfrm>
-            <a:off x="4038778" y="5480402"/>
+            <a:off x="4038778" y="5572762"/>
             <a:ext cx="3735153" cy="1169551"/>
           </a:xfrm>
           <a:prstGeom prst="rect">
@@ -3503,6 +3559,9 @@
           <a:p>
             <a:r>
               <a:rPr lang="en-US" sz="1400" b="1" dirty="0" smtClean="0">
+                <a:solidFill>
+                  <a:srgbClr val="0070C0"/>
+                </a:solidFill>
                 <a:latin typeface="Consolas" panose="020B0609020204030204" pitchFamily="49" charset="0"/>
               </a:rPr>
               <a:t>[SUCCESS FACTORS]</a:t>
@@ -3512,7 +3571,10 @@
             <a:r>
               <a:rPr lang="en-US" sz="1400" dirty="0" smtClean="0">
                 <a:solidFill>
-                  <a:schemeClr val="accent5"/>
+                  <a:schemeClr val="tx1">
+                    <a:lumMod val="95000"/>
+                    <a:lumOff val="5000"/>
+                  </a:schemeClr>
                 </a:solidFill>
                 <a:latin typeface="Consolas" panose="020B0609020204030204" pitchFamily="49" charset="0"/>
               </a:rPr>
@@ -3521,7 +3583,10 @@
             <a:br>
               <a:rPr lang="en-US" sz="1400" dirty="0" smtClean="0">
                 <a:solidFill>
-                  <a:schemeClr val="accent5"/>
+                  <a:schemeClr val="tx1">
+                    <a:lumMod val="95000"/>
+                    <a:lumOff val="5000"/>
+                  </a:schemeClr>
                 </a:solidFill>
                 <a:latin typeface="Consolas" panose="020B0609020204030204" pitchFamily="49" charset="0"/>
               </a:rPr>
@@ -3529,7 +3594,10 @@
             <a:r>
               <a:rPr lang="en-US" sz="1400" dirty="0" smtClean="0">
                 <a:solidFill>
-                  <a:schemeClr val="accent5"/>
+                  <a:schemeClr val="tx1">
+                    <a:lumMod val="95000"/>
+                    <a:lumOff val="5000"/>
+                  </a:schemeClr>
                 </a:solidFill>
                 <a:latin typeface="Consolas" panose="020B0609020204030204" pitchFamily="49" charset="0"/>
               </a:rPr>
@@ -3540,7 +3608,10 @@
             <a:r>
               <a:rPr lang="en-US" sz="1400" dirty="0" smtClean="0">
                 <a:solidFill>
-                  <a:schemeClr val="accent5"/>
+                  <a:schemeClr val="tx1">
+                    <a:lumMod val="95000"/>
+                    <a:lumOff val="5000"/>
+                  </a:schemeClr>
                 </a:solidFill>
                 <a:latin typeface="Consolas" panose="020B0609020204030204" pitchFamily="49" charset="0"/>
               </a:rPr>
@@ -3549,7 +3620,10 @@
             <a:br>
               <a:rPr lang="en-US" sz="1400" dirty="0" smtClean="0">
                 <a:solidFill>
-                  <a:schemeClr val="accent5"/>
+                  <a:schemeClr val="tx1">
+                    <a:lumMod val="95000"/>
+                    <a:lumOff val="5000"/>
+                  </a:schemeClr>
                 </a:solidFill>
                 <a:latin typeface="Consolas" panose="020B0609020204030204" pitchFamily="49" charset="0"/>
               </a:rPr>
@@ -3557,7 +3631,10 @@
             <a:r>
               <a:rPr lang="en-US" sz="1400" dirty="0" smtClean="0">
                 <a:solidFill>
-                  <a:schemeClr val="accent5"/>
+                  <a:schemeClr val="tx1">
+                    <a:lumMod val="95000"/>
+                    <a:lumOff val="5000"/>
+                  </a:schemeClr>
                 </a:solidFill>
                 <a:latin typeface="Consolas" panose="020B0609020204030204" pitchFamily="49" charset="0"/>
               </a:rPr>
@@ -3574,7 +3651,7 @@
         </p:nvSpPr>
         <p:spPr>
           <a:xfrm>
-            <a:off x="1202724" y="2026333"/>
+            <a:off x="840847" y="1861657"/>
             <a:ext cx="10510305" cy="584775"/>
           </a:xfrm>
           <a:prstGeom prst="rect">
@@ -3589,18 +3666,27 @@
           <a:p>
             <a:r>
               <a:rPr lang="en-US" sz="1600" b="1" dirty="0" smtClean="0">
+                <a:solidFill>
+                  <a:srgbClr val="0070C0"/>
+                </a:solidFill>
                 <a:latin typeface="Consolas" panose="020B0609020204030204" pitchFamily="49" charset="0"/>
               </a:rPr>
               <a:t>[</a:t>
             </a:r>
             <a:r>
               <a:rPr lang="en-US" sz="1600" b="1" dirty="0">
+                <a:solidFill>
+                  <a:srgbClr val="0070C0"/>
+                </a:solidFill>
                 <a:latin typeface="Consolas" panose="020B0609020204030204" pitchFamily="49" charset="0"/>
               </a:rPr>
               <a:t>FREE </a:t>
             </a:r>
             <a:r>
               <a:rPr lang="en-US" sz="1600" b="1" dirty="0" smtClean="0">
+                <a:solidFill>
+                  <a:srgbClr val="0070C0"/>
+                </a:solidFill>
                 <a:latin typeface="Consolas" panose="020B0609020204030204" pitchFamily="49" charset="0"/>
               </a:rPr>
               <a:t>AGENTS] </a:t>
@@ -3608,15 +3694,21 @@
             <a:r>
               <a:rPr lang="en-US" sz="1600" dirty="0" smtClean="0">
                 <a:solidFill>
-                  <a:schemeClr val="accent5"/>
-                </a:solidFill>
-                <a:latin typeface="Consolas" panose="020B0609020204030204" pitchFamily="49" charset="0"/>
-              </a:rPr>
-              <a:t>Uniquely skilled public servants that can move freely around the organization as needed</a:t>
+                  <a:schemeClr val="tx1">
+                    <a:lumMod val="95000"/>
+                    <a:lumOff val="5000"/>
+                  </a:schemeClr>
+                </a:solidFill>
+                <a:latin typeface="Consolas" panose="020B0609020204030204" pitchFamily="49" charset="0"/>
+              </a:rPr>
+              <a:t>Uniquely skilled public servants that can move freely around the organization as needed.</a:t>
             </a:r>
             <a:endParaRPr lang="en-CA" sz="1600" dirty="0">
               <a:solidFill>
-                <a:schemeClr val="accent5"/>
+                <a:schemeClr val="tx1">
+                  <a:lumMod val="95000"/>
+                  <a:lumOff val="5000"/>
+                </a:schemeClr>
               </a:solidFill>
               <a:latin typeface="Consolas" panose="020B0609020204030204" pitchFamily="49" charset="0"/>
             </a:endParaRPr>
@@ -3631,7 +3723,7 @@
         </p:nvSpPr>
         <p:spPr>
           <a:xfrm>
-            <a:off x="1202724" y="2632201"/>
+            <a:off x="840847" y="2540289"/>
             <a:ext cx="10370967" cy="584775"/>
           </a:xfrm>
           <a:prstGeom prst="rect">
@@ -3646,6 +3738,9 @@
           <a:p>
             <a:r>
               <a:rPr lang="en-US" sz="1600" b="1" dirty="0" smtClean="0">
+                <a:solidFill>
+                  <a:srgbClr val="0070C0"/>
+                </a:solidFill>
                 <a:latin typeface="Consolas" panose="020B0609020204030204" pitchFamily="49" charset="0"/>
               </a:rPr>
               <a:t>[MISSIONS] </a:t>
@@ -3653,11 +3748,14 @@
             <a:r>
               <a:rPr lang="en-US" sz="1600" dirty="0" smtClean="0">
                 <a:solidFill>
-                  <a:schemeClr val="accent5"/>
-                </a:solidFill>
-                <a:latin typeface="Consolas" panose="020B0609020204030204" pitchFamily="49" charset="0"/>
-              </a:rPr>
-              <a:t>Specific and well scoped challenges tackled in a set time period, in partnership with existing teams</a:t>
+                  <a:schemeClr val="tx1">
+                    <a:lumMod val="95000"/>
+                    <a:lumOff val="5000"/>
+                  </a:schemeClr>
+                </a:solidFill>
+                <a:latin typeface="Consolas" panose="020B0609020204030204" pitchFamily="49" charset="0"/>
+              </a:rPr>
+              <a:t>Specific and well scoped challenges tackled in a set time period, in partnership with existing teams.</a:t>
             </a:r>
           </a:p>
         </p:txBody>
@@ -3670,7 +3768,7 @@
         </p:nvSpPr>
         <p:spPr>
           <a:xfrm>
-            <a:off x="815546" y="4794422"/>
+            <a:off x="815546" y="4739006"/>
             <a:ext cx="1202724" cy="369332"/>
           </a:xfrm>
           <a:prstGeom prst="rect">
@@ -3696,7 +3794,7 @@
         </p:nvSpPr>
         <p:spPr>
           <a:xfrm>
-            <a:off x="399185" y="4878633"/>
+            <a:off x="399185" y="4837480"/>
             <a:ext cx="1619085" cy="430887"/>
           </a:xfrm>
           <a:prstGeom prst="rect">
@@ -3712,7 +3810,7 @@
           <a:p>
             <a:pPr algn="ctr"/>
             <a:r>
-              <a:rPr lang="en-US" sz="1100" smtClean="0">
+              <a:rPr lang="en-US" sz="1100" dirty="0" smtClean="0">
                 <a:solidFill>
                   <a:schemeClr val="bg2"/>
                 </a:solidFill>
@@ -3720,7 +3818,7 @@
               </a:rPr>
               <a:t>Crowdsource a list of challenges</a:t>
             </a:r>
-            <a:endParaRPr lang="en-CA" sz="1100">
+            <a:endParaRPr lang="en-CA" sz="1100" dirty="0">
               <a:solidFill>
                 <a:schemeClr val="bg2"/>
               </a:solidFill>
@@ -3737,7 +3835,7 @@
         </p:nvGrpSpPr>
         <p:grpSpPr>
           <a:xfrm>
-            <a:off x="708104" y="3611060"/>
+            <a:off x="708104" y="3555644"/>
             <a:ext cx="1013604" cy="1225266"/>
             <a:chOff x="708104" y="3611060"/>
             <a:chExt cx="1013604" cy="1225266"/>
@@ -3965,7 +4063,7 @@
         </p:nvSpPr>
         <p:spPr>
           <a:xfrm>
-            <a:off x="2343227" y="4892897"/>
+            <a:off x="2343227" y="4837481"/>
             <a:ext cx="1619085" cy="430887"/>
           </a:xfrm>
           <a:prstGeom prst="rect">
@@ -4006,7 +4104,7 @@
         </p:nvGrpSpPr>
         <p:grpSpPr>
           <a:xfrm>
-            <a:off x="2567621" y="3497325"/>
+            <a:off x="2567621" y="3441909"/>
             <a:ext cx="1346566" cy="1335744"/>
             <a:chOff x="2567621" y="3497325"/>
             <a:chExt cx="1346566" cy="1335744"/>
@@ -4094,7 +4192,7 @@
         </p:nvSpPr>
         <p:spPr>
           <a:xfrm>
-            <a:off x="4287269" y="4901828"/>
+            <a:off x="4287269" y="4846412"/>
             <a:ext cx="1924061" cy="430887"/>
           </a:xfrm>
           <a:prstGeom prst="rect">
@@ -4135,7 +4233,7 @@
         </p:nvGrpSpPr>
         <p:grpSpPr>
           <a:xfrm>
-            <a:off x="4857616" y="3631566"/>
+            <a:off x="4857616" y="3576150"/>
             <a:ext cx="1002105" cy="1276263"/>
             <a:chOff x="4699230" y="3650059"/>
             <a:chExt cx="1002105" cy="1276263"/>
@@ -4363,7 +4461,7 @@
         </p:nvSpPr>
         <p:spPr>
           <a:xfrm>
-            <a:off x="6394121" y="4902144"/>
+            <a:off x="6394121" y="4846728"/>
             <a:ext cx="1924061" cy="430887"/>
           </a:xfrm>
           <a:prstGeom prst="rect">
@@ -4404,7 +4502,7 @@
         </p:nvSpPr>
         <p:spPr>
           <a:xfrm>
-            <a:off x="8126363" y="4902144"/>
+            <a:off x="8246431" y="4846728"/>
             <a:ext cx="1924061" cy="430887"/>
           </a:xfrm>
           <a:prstGeom prst="rect">
@@ -4462,7 +4560,7 @@
         </p:nvSpPr>
         <p:spPr>
           <a:xfrm>
-            <a:off x="10159181" y="4874951"/>
+            <a:off x="10159181" y="4837481"/>
             <a:ext cx="1924061" cy="430887"/>
           </a:xfrm>
           <a:prstGeom prst="rect">
@@ -4478,7 +4576,7 @@
           <a:p>
             <a:pPr algn="ctr"/>
             <a:r>
-              <a:rPr lang="en-US" sz="1100" smtClean="0">
+              <a:rPr lang="en-US" sz="1100" dirty="0" smtClean="0">
                 <a:solidFill>
                   <a:schemeClr val="bg2"/>
                 </a:solidFill>
@@ -4486,7 +4584,7 @@
               </a:rPr>
               <a:t>Evaluate the Mission, extend OR move on</a:t>
             </a:r>
-            <a:endParaRPr lang="en-CA" sz="1100">
+            <a:endParaRPr lang="en-CA" sz="1100" dirty="0">
               <a:solidFill>
                 <a:schemeClr val="bg2"/>
               </a:solidFill>
@@ -4503,7 +4601,7 @@
         </p:nvSpPr>
         <p:spPr>
           <a:xfrm>
-            <a:off x="8078020" y="5480402"/>
+            <a:off x="8078020" y="5572762"/>
             <a:ext cx="3861955" cy="1384995"/>
           </a:xfrm>
           <a:prstGeom prst="rect">
@@ -4518,36 +4616,16 @@
           <a:p>
             <a:r>
               <a:rPr lang="en-US" sz="1400" b="1" dirty="0" smtClean="0">
+                <a:solidFill>
+                  <a:srgbClr val="0070C0"/>
+                </a:solidFill>
                 <a:latin typeface="Consolas" panose="020B0609020204030204" pitchFamily="49" charset="0"/>
               </a:rPr>
               <a:t>[JOIN IN]</a:t>
-            </a:r>
-            <a:endParaRPr lang="en-CA" sz="1400" dirty="0" smtClean="0">
-              <a:latin typeface="Consolas" panose="020B0609020204030204" pitchFamily="49" charset="0"/>
-            </a:endParaRPr>
-          </a:p>
-          <a:p>
-            <a:r>
-              <a:rPr lang="en-CA" sz="1400" dirty="0" smtClean="0">
-                <a:solidFill>
-                  <a:schemeClr val="accent5"/>
-                </a:solidFill>
-                <a:latin typeface="Consolas" panose="020B0609020204030204" pitchFamily="49" charset="0"/>
-              </a:rPr>
-              <a:t>- github.com/SSC-CIO-</a:t>
-            </a:r>
-            <a:r>
-              <a:rPr lang="en-CA" sz="1400" dirty="0" err="1" smtClean="0">
-                <a:solidFill>
-                  <a:schemeClr val="accent5"/>
-                </a:solidFill>
-                <a:latin typeface="Consolas" panose="020B0609020204030204" pitchFamily="49" charset="0"/>
-              </a:rPr>
-              <a:t>DigitalTaskForce</a:t>
             </a:r>
             <a:endParaRPr lang="en-CA" sz="1400" dirty="0" smtClean="0">
               <a:solidFill>
-                <a:schemeClr val="accent5"/>
+                <a:srgbClr val="0070C0"/>
               </a:solidFill>
               <a:latin typeface="Consolas" panose="020B0609020204030204" pitchFamily="49" charset="0"/>
             </a:endParaRPr>
@@ -4556,16 +4634,22 @@
             <a:r>
               <a:rPr lang="en-CA" sz="1400" dirty="0" smtClean="0">
                 <a:solidFill>
-                  <a:schemeClr val="accent5"/>
-                </a:solidFill>
-                <a:latin typeface="Consolas" panose="020B0609020204030204" pitchFamily="49" charset="0"/>
-              </a:rPr>
-              <a:t>- Twitter: @SSC-CIO-</a:t>
+                  <a:schemeClr val="tx1">
+                    <a:lumMod val="95000"/>
+                    <a:lumOff val="5000"/>
+                  </a:schemeClr>
+                </a:solidFill>
+                <a:latin typeface="Consolas" panose="020B0609020204030204" pitchFamily="49" charset="0"/>
+              </a:rPr>
+              <a:t>- github.com/SSC-CIO-</a:t>
             </a:r>
             <a:r>
               <a:rPr lang="en-CA" sz="1400" dirty="0" err="1" smtClean="0">
                 <a:solidFill>
-                  <a:schemeClr val="accent5"/>
+                  <a:schemeClr val="tx1">
+                    <a:lumMod val="95000"/>
+                    <a:lumOff val="5000"/>
+                  </a:schemeClr>
                 </a:solidFill>
                 <a:latin typeface="Consolas" panose="020B0609020204030204" pitchFamily="49" charset="0"/>
               </a:rPr>
@@ -4573,34 +4657,45 @@
             </a:r>
             <a:endParaRPr lang="en-CA" sz="1400" dirty="0" smtClean="0">
               <a:solidFill>
-                <a:schemeClr val="accent5"/>
+                <a:schemeClr val="tx1">
+                  <a:lumMod val="95000"/>
+                  <a:lumOff val="5000"/>
+                </a:schemeClr>
               </a:solidFill>
               <a:latin typeface="Consolas" panose="020B0609020204030204" pitchFamily="49" charset="0"/>
             </a:endParaRPr>
           </a:p>
           <a:p>
             <a:r>
-              <a:rPr lang="en-US" sz="1400" dirty="0" smtClean="0">
-                <a:solidFill>
-                  <a:schemeClr val="accent5"/>
-                </a:solidFill>
-                <a:latin typeface="Consolas" panose="020B0609020204030204" pitchFamily="49" charset="0"/>
-              </a:rPr>
-              <a:t>- Email: </a:t>
-            </a:r>
-            <a:r>
-              <a:rPr lang="en-US" sz="1400" dirty="0" smtClean="0">
-                <a:solidFill>
-                  <a:schemeClr val="accent5"/>
-                </a:solidFill>
-                <a:latin typeface="Consolas" panose="020B0609020204030204" pitchFamily="49" charset="0"/>
-                <a:hlinkClick r:id="rId4"/>
-              </a:rPr>
-              <a:t>Brittany.hurley@Canada.ca</a:t>
-            </a:r>
-            <a:endParaRPr lang="en-US" sz="1400" dirty="0" smtClean="0">
+              <a:rPr lang="en-CA" sz="1400" dirty="0" smtClean="0">
+                <a:solidFill>
+                  <a:schemeClr val="tx1">
+                    <a:lumMod val="95000"/>
+                    <a:lumOff val="5000"/>
+                  </a:schemeClr>
+                </a:solidFill>
+                <a:latin typeface="Consolas" panose="020B0609020204030204" pitchFamily="49" charset="0"/>
+              </a:rPr>
+              <a:t>- Twitter: @SSC-CIO-</a:t>
+            </a:r>
+            <a:r>
+              <a:rPr lang="en-CA" sz="1400" dirty="0" err="1" smtClean="0">
+                <a:solidFill>
+                  <a:schemeClr val="tx1">
+                    <a:lumMod val="95000"/>
+                    <a:lumOff val="5000"/>
+                  </a:schemeClr>
+                </a:solidFill>
+                <a:latin typeface="Consolas" panose="020B0609020204030204" pitchFamily="49" charset="0"/>
+              </a:rPr>
+              <a:t>DigitalTaskForce</a:t>
+            </a:r>
+            <a:endParaRPr lang="en-CA" sz="1400" dirty="0" smtClean="0">
               <a:solidFill>
-                <a:schemeClr val="accent5"/>
+                <a:schemeClr val="tx1">
+                  <a:lumMod val="95000"/>
+                  <a:lumOff val="5000"/>
+                </a:schemeClr>
               </a:solidFill>
               <a:latin typeface="Consolas" panose="020B0609020204030204" pitchFamily="49" charset="0"/>
             </a:endParaRPr>
@@ -4609,29 +4704,74 @@
             <a:r>
               <a:rPr lang="en-US" sz="1400" dirty="0" smtClean="0">
                 <a:solidFill>
-                  <a:schemeClr val="accent5"/>
-                </a:solidFill>
-                <a:latin typeface="Consolas" panose="020B0609020204030204" pitchFamily="49" charset="0"/>
-              </a:rPr>
-              <a:t>- Slack: #CIO-</a:t>
-            </a:r>
-            <a:r>
-              <a:rPr lang="en-US" sz="1400" dirty="0" err="1" smtClean="0">
-                <a:solidFill>
-                  <a:schemeClr val="accent5"/>
-                </a:solidFill>
-                <a:latin typeface="Consolas" panose="020B0609020204030204" pitchFamily="49" charset="0"/>
-              </a:rPr>
-              <a:t>DigitalTaskForce</a:t>
-            </a:r>
-            <a:endParaRPr lang="en-CA" sz="1400" dirty="0" smtClean="0">
+                  <a:schemeClr val="tx1">
+                    <a:lumMod val="95000"/>
+                    <a:lumOff val="5000"/>
+                  </a:schemeClr>
+                </a:solidFill>
+                <a:latin typeface="Consolas" panose="020B0609020204030204" pitchFamily="49" charset="0"/>
+              </a:rPr>
+              <a:t>- Email: </a:t>
+            </a:r>
+            <a:r>
+              <a:rPr lang="en-US" sz="1400" dirty="0" smtClean="0">
+                <a:solidFill>
+                  <a:schemeClr val="tx1">
+                    <a:lumMod val="95000"/>
+                    <a:lumOff val="5000"/>
+                  </a:schemeClr>
+                </a:solidFill>
+                <a:latin typeface="Consolas" panose="020B0609020204030204" pitchFamily="49" charset="0"/>
+                <a:hlinkClick r:id="rId4"/>
+              </a:rPr>
+              <a:t>brittany.hurley@Canada.ca</a:t>
+            </a:r>
+            <a:endParaRPr lang="en-US" sz="1400" dirty="0" smtClean="0">
               <a:solidFill>
-                <a:schemeClr val="accent5"/>
+                <a:schemeClr val="tx1">
+                  <a:lumMod val="95000"/>
+                  <a:lumOff val="5000"/>
+                </a:schemeClr>
               </a:solidFill>
               <a:latin typeface="Consolas" panose="020B0609020204030204" pitchFamily="49" charset="0"/>
             </a:endParaRPr>
           </a:p>
           <a:p>
+            <a:r>
+              <a:rPr lang="en-US" sz="1400" dirty="0" smtClean="0">
+                <a:solidFill>
+                  <a:schemeClr val="tx1">
+                    <a:lumMod val="95000"/>
+                    <a:lumOff val="5000"/>
+                  </a:schemeClr>
+                </a:solidFill>
+                <a:latin typeface="Consolas" panose="020B0609020204030204" pitchFamily="49" charset="0"/>
+              </a:rPr>
+              <a:t>- Slack: #CIO-</a:t>
+            </a:r>
+            <a:r>
+              <a:rPr lang="en-US" sz="1400" dirty="0" err="1" smtClean="0">
+                <a:solidFill>
+                  <a:schemeClr val="tx1">
+                    <a:lumMod val="95000"/>
+                    <a:lumOff val="5000"/>
+                  </a:schemeClr>
+                </a:solidFill>
+                <a:latin typeface="Consolas" panose="020B0609020204030204" pitchFamily="49" charset="0"/>
+              </a:rPr>
+              <a:t>DigitalTaskForce</a:t>
+            </a:r>
+            <a:endParaRPr lang="en-CA" sz="1400" dirty="0" smtClean="0">
+              <a:solidFill>
+                <a:schemeClr val="tx1">
+                  <a:lumMod val="95000"/>
+                  <a:lumOff val="5000"/>
+                </a:schemeClr>
+              </a:solidFill>
+              <a:latin typeface="Consolas" panose="020B0609020204030204" pitchFamily="49" charset="0"/>
+            </a:endParaRPr>
+          </a:p>
+          <a:p>
             <a:endParaRPr lang="en-CA" sz="1400" dirty="0">
               <a:latin typeface="Consolas" panose="020B0609020204030204" pitchFamily="49" charset="0"/>
             </a:endParaRPr>
@@ -4646,7 +4786,7 @@
         </p:nvSpPr>
         <p:spPr>
           <a:xfrm>
-            <a:off x="7140703" y="3709183"/>
+            <a:off x="7140703" y="3653767"/>
             <a:ext cx="345989" cy="1014092"/>
           </a:xfrm>
           <a:prstGeom prst="flowChartProcess">
@@ -4703,7 +4843,7 @@
         </p:blipFill>
         <p:spPr>
           <a:xfrm>
-            <a:off x="6771074" y="3718061"/>
+            <a:off x="6771074" y="3662645"/>
             <a:ext cx="1085249" cy="1085249"/>
           </a:xfrm>
           <a:prstGeom prst="rect">
@@ -4719,7 +4859,7 @@
         </p:nvGrpSpPr>
         <p:grpSpPr>
           <a:xfrm>
-            <a:off x="8076389" y="3748824"/>
+            <a:off x="8196457" y="3693408"/>
             <a:ext cx="1974035" cy="1053031"/>
             <a:chOff x="8076389" y="3748824"/>
             <a:chExt cx="1974035" cy="1053031"/>
@@ -4890,7 +5030,7 @@
         </p:nvGrpSpPr>
         <p:grpSpPr>
           <a:xfrm>
-            <a:off x="10413961" y="3800270"/>
+            <a:off x="10413961" y="3744854"/>
             <a:ext cx="1227317" cy="870751"/>
             <a:chOff x="10413961" y="3800270"/>
             <a:chExt cx="1227317" cy="870751"/>
@@ -5015,6 +5155,13 @@
   <p:clrMapOvr>
     <a:masterClrMapping/>
   </p:clrMapOvr>
+  <p:timing>
+    <p:tnLst>
+      <p:par>
+        <p:cTn id="1" dur="indefinite" restart="never" nodeType="tmRoot"/>
+      </p:par>
+    </p:tnLst>
+  </p:timing>
 </p:sld>
 </file>
 
@@ -5088,7 +5235,7 @@
         </p:nvSpPr>
         <p:spPr>
           <a:xfrm>
-            <a:off x="1407193" y="2480010"/>
+            <a:off x="1407193" y="2526192"/>
             <a:ext cx="8971247" cy="1569660"/>
           </a:xfrm>
           <a:prstGeom prst="rect">
@@ -5174,7 +5321,7 @@
         </p:nvSpPr>
         <p:spPr>
           <a:xfrm>
-            <a:off x="0" y="2179209"/>
+            <a:off x="0" y="2152800"/>
             <a:ext cx="2053767" cy="461665"/>
           </a:xfrm>
           <a:prstGeom prst="rect">
@@ -5207,6 +5354,13 @@
   <p:clrMapOvr>
     <a:masterClrMapping/>
   </p:clrMapOvr>
+  <p:timing>
+    <p:tnLst>
+      <p:par>
+        <p:cTn id="1" dur="indefinite" restart="never" nodeType="tmRoot"/>
+      </p:par>
+    </p:tnLst>
+  </p:timing>
 </p:sld>
 </file>
 
@@ -5280,7 +5434,7 @@
         </p:nvSpPr>
         <p:spPr>
           <a:xfrm>
-            <a:off x="1433030" y="2888706"/>
+            <a:off x="1433030" y="2856674"/>
             <a:ext cx="9325939" cy="1200329"/>
           </a:xfrm>
           <a:prstGeom prst="rect">
@@ -5295,13 +5449,22 @@
           <a:p>
             <a:pPr algn="just"/>
             <a:r>
+              <a:rPr lang="en-US" sz="2400" b="1" dirty="0" smtClean="0">
+                <a:solidFill>
+                  <a:schemeClr val="bg2"/>
+                </a:solidFill>
+                <a:latin typeface="Consolas" panose="020B0609020204030204" pitchFamily="49" charset="0"/>
+              </a:rPr>
+              <a:t>Uniquely skilled public servants </a:t>
+            </a:r>
+            <a:r>
               <a:rPr lang="en-US" sz="2400" dirty="0" smtClean="0">
                 <a:solidFill>
                   <a:schemeClr val="bg2"/>
                 </a:solidFill>
                 <a:latin typeface="Consolas" panose="020B0609020204030204" pitchFamily="49" charset="0"/>
               </a:rPr>
-              <a:t>Uniquely skilled public servants that can move freely around the organization as needed both as a team, or individually</a:t>
+              <a:t>that can move freely around the organization as needed, both as a team, or individually.</a:t>
             </a:r>
           </a:p>
         </p:txBody>
@@ -5314,8 +5477,8 @@
         </p:nvGrpSpPr>
         <p:grpSpPr>
           <a:xfrm>
-            <a:off x="6956256" y="5973047"/>
-            <a:ext cx="6914606" cy="884953"/>
+            <a:off x="6837730" y="5778313"/>
+            <a:ext cx="5210337" cy="884953"/>
             <a:chOff x="3795044" y="3619334"/>
             <a:chExt cx="6914606" cy="884953"/>
           </a:xfrm>
@@ -5370,7 +5533,7 @@
           <p:spPr>
             <a:xfrm>
               <a:off x="3795044" y="3619334"/>
-              <a:ext cx="5480909" cy="677108"/>
+              <a:ext cx="6701119" cy="677108"/>
             </a:xfrm>
             <a:prstGeom prst="rect">
               <a:avLst/>
@@ -5387,7 +5550,7 @@
                 <a:rPr lang="en-US" sz="1400" b="1" dirty="0" smtClean="0">
                   <a:latin typeface="Consolas" panose="020B0609020204030204" pitchFamily="49" charset="0"/>
                 </a:rPr>
-                <a:t>[CANADAS FREE AGENTS]</a:t>
+                <a:t>[CANADA’S FREE AGENTS]</a:t>
               </a:r>
             </a:p>
             <a:p>
@@ -5395,7 +5558,7 @@
                 <a:rPr lang="en-US" sz="1200" dirty="0" smtClean="0">
                   <a:latin typeface="Consolas" panose="020B0609020204030204" pitchFamily="49" charset="0"/>
                 </a:rPr>
-                <a:t>We are not the Free Agents out of TBS, but we like them so much we’re stealing their idea for SSC</a:t>
+                <a:t>We are not the Free Agents out of TBS, but we like them so much we’re stealing their idea for SSC:</a:t>
               </a:r>
               <a:endParaRPr lang="en-CA" sz="1200" dirty="0">
                 <a:latin typeface="Consolas" panose="020B0609020204030204" pitchFamily="49" charset="0"/>
@@ -5426,7 +5589,7 @@
         </p:blipFill>
         <p:spPr>
           <a:xfrm>
-            <a:off x="6186636" y="6044940"/>
+            <a:off x="5974978" y="5862983"/>
             <a:ext cx="769620" cy="769620"/>
           </a:xfrm>
           <a:prstGeom prst="rect">
@@ -5442,8 +5605,8 @@
         </p:nvSpPr>
         <p:spPr>
           <a:xfrm>
-            <a:off x="0" y="2162207"/>
-            <a:ext cx="2563522" cy="461665"/>
+            <a:off x="0" y="2153894"/>
+            <a:ext cx="2055600" cy="461665"/>
           </a:xfrm>
           <a:prstGeom prst="rect">
             <a:avLst/>
@@ -5486,6 +5649,13 @@
   <p:clrMapOvr>
     <a:masterClrMapping/>
   </p:clrMapOvr>
+  <p:timing>
+    <p:tnLst>
+      <p:par>
+        <p:cTn id="1" dur="indefinite" restart="never" nodeType="tmRoot"/>
+      </p:par>
+    </p:tnLst>
+  </p:timing>
 </p:sld>
 </file>
 
@@ -5573,63 +5743,95 @@
           <a:lstStyle/>
           <a:p>
             <a:r>
+              <a:rPr lang="en-US" sz="2400" b="1" dirty="0" smtClean="0">
+                <a:solidFill>
+                  <a:schemeClr val="bg2"/>
+                </a:solidFill>
+                <a:latin typeface="Consolas" panose="020B0609020204030204" pitchFamily="49" charset="0"/>
+              </a:rPr>
+              <a:t>Specific and well scoped challenges </a:t>
+            </a:r>
+            <a:r>
               <a:rPr lang="en-US" sz="2400" dirty="0" smtClean="0">
                 <a:solidFill>
                   <a:schemeClr val="bg2"/>
                 </a:solidFill>
                 <a:latin typeface="Consolas" panose="020B0609020204030204" pitchFamily="49" charset="0"/>
               </a:rPr>
-              <a:t>Specific and well scoped challenges tackled in a set time period, in partnership with existing teams.</a:t>
-            </a:r>
-          </a:p>
-        </p:txBody>
-      </p:sp>
-      <p:sp>
-        <p:nvSpPr>
-          <p:cNvPr id="2" name="Rectangle 1"/>
+              <a:t>tackled in a set time period, in partnership with existing teams.</a:t>
+            </a:r>
+          </a:p>
+        </p:txBody>
+      </p:sp>
+      <p:sp>
+        <p:nvSpPr>
+          <p:cNvPr id="8" name="Rectangle 7"/>
           <p:cNvSpPr/>
           <p:nvPr/>
         </p:nvSpPr>
         <p:spPr>
           <a:xfrm>
-            <a:off x="6000206" y="6096336"/>
-            <a:ext cx="6096000" cy="677108"/>
+            <a:off x="0" y="2152800"/>
+            <a:ext cx="2053767" cy="461665"/>
           </a:xfrm>
           <a:prstGeom prst="rect">
             <a:avLst/>
           </a:prstGeom>
         </p:spPr>
         <p:txBody>
-          <a:bodyPr>
+          <a:bodyPr wrap="none">
             <a:spAutoFit/>
           </a:bodyPr>
           <a:lstStyle/>
           <a:p>
-            <a:pPr lvl="1"/>
+            <a:r>
+              <a:rPr lang="en-US" sz="2400" b="1" dirty="0">
+                <a:latin typeface="Consolas" panose="020B0609020204030204" pitchFamily="49" charset="0"/>
+              </a:rPr>
+              <a:t>[MISSIONS] </a:t>
+            </a:r>
+          </a:p>
+        </p:txBody>
+      </p:sp>
+      <p:sp>
+        <p:nvSpPr>
+          <p:cNvPr id="15" name="TextBox 14"/>
+          <p:cNvSpPr txBox="1"/>
+          <p:nvPr/>
+        </p:nvSpPr>
+        <p:spPr>
+          <a:xfrm>
+            <a:off x="6837730" y="5905611"/>
+            <a:ext cx="5049469" cy="508722"/>
+          </a:xfrm>
+          <a:prstGeom prst="rect">
+            <a:avLst/>
+          </a:prstGeom>
+          <a:noFill/>
+        </p:spPr>
+        <p:txBody>
+          <a:bodyPr wrap="square" rtlCol="0">
+            <a:spAutoFit/>
+          </a:bodyPr>
+          <a:lstStyle/>
+          <a:p>
+            <a:r>
+              <a:rPr lang="en-US" sz="1400" b="1" dirty="0">
+                <a:latin typeface="Consolas" panose="020B0609020204030204" pitchFamily="49" charset="0"/>
+              </a:rPr>
+              <a:t>[Digital != </a:t>
+            </a:r>
             <a:r>
               <a:rPr lang="en-US" sz="1400" b="1" dirty="0" smtClean="0">
                 <a:latin typeface="Consolas" panose="020B0609020204030204" pitchFamily="49" charset="0"/>
               </a:rPr>
-              <a:t>[Digital </a:t>
-            </a:r>
-            <a:r>
-              <a:rPr lang="en-US" sz="1400" b="1" dirty="0">
-                <a:latin typeface="Consolas" panose="020B0609020204030204" pitchFamily="49" charset="0"/>
-              </a:rPr>
-              <a:t>!= </a:t>
-            </a:r>
-            <a:r>
-              <a:rPr lang="en-US" sz="1400" b="1" dirty="0" smtClean="0">
-                <a:latin typeface="Consolas" panose="020B0609020204030204" pitchFamily="49" charset="0"/>
-              </a:rPr>
-              <a:t>technical] </a:t>
+              <a:t>Technical]</a:t>
             </a:r>
             <a:endParaRPr lang="en-US" sz="1400" b="1" dirty="0">
               <a:latin typeface="Consolas" panose="020B0609020204030204" pitchFamily="49" charset="0"/>
             </a:endParaRPr>
           </a:p>
           <a:p>
-            <a:pPr lvl="1"/>
             <a:r>
               <a:rPr lang="en-US" sz="1200" dirty="0" smtClean="0">
                 <a:latin typeface="Consolas" panose="020B0609020204030204" pitchFamily="49" charset="0"/>
@@ -5647,7 +5849,7 @@
       </p:sp>
       <p:pic>
         <p:nvPicPr>
-          <p:cNvPr id="4" name="Picture 3"/>
+          <p:cNvPr id="16" name="Picture 15"/>
           <p:cNvPicPr>
             <a:picLocks noChangeAspect="1"/>
           </p:cNvPicPr>
@@ -5667,44 +5869,14 @@
         </p:blipFill>
         <p:spPr>
           <a:xfrm>
-            <a:off x="5832566" y="6124019"/>
-            <a:ext cx="618648" cy="618648"/>
+            <a:off x="5974978" y="5862983"/>
+            <a:ext cx="769620" cy="769620"/>
           </a:xfrm>
           <a:prstGeom prst="rect">
             <a:avLst/>
           </a:prstGeom>
         </p:spPr>
       </p:pic>
-      <p:sp>
-        <p:nvSpPr>
-          <p:cNvPr id="8" name="Rectangle 7"/>
-          <p:cNvSpPr/>
-          <p:nvPr/>
-        </p:nvSpPr>
-        <p:spPr>
-          <a:xfrm>
-            <a:off x="0" y="2120103"/>
-            <a:ext cx="2053767" cy="461665"/>
-          </a:xfrm>
-          <a:prstGeom prst="rect">
-            <a:avLst/>
-          </a:prstGeom>
-        </p:spPr>
-        <p:txBody>
-          <a:bodyPr wrap="none">
-            <a:spAutoFit/>
-          </a:bodyPr>
-          <a:lstStyle/>
-          <a:p>
-            <a:r>
-              <a:rPr lang="en-US" sz="2400" b="1" dirty="0">
-                <a:latin typeface="Consolas" panose="020B0609020204030204" pitchFamily="49" charset="0"/>
-              </a:rPr>
-              <a:t>[MISSIONS] </a:t>
-            </a:r>
-          </a:p>
-        </p:txBody>
-      </p:sp>
     </p:spTree>
     <p:extLst>
       <p:ext uri="{BB962C8B-B14F-4D97-AF65-F5344CB8AC3E}">
@@ -5715,6 +5887,13 @@
   <p:clrMapOvr>
     <a:masterClrMapping/>
   </p:clrMapOvr>
+  <p:timing>
+    <p:tnLst>
+      <p:par>
+        <p:cTn id="1" dur="indefinite" restart="never" nodeType="tmRoot"/>
+      </p:par>
+    </p:tnLst>
+  </p:timing>
 </p:sld>
 </file>
 
@@ -5815,7 +5994,7 @@
         <p:spPr>
           <a:xfrm>
             <a:off x="399185" y="3984935"/>
-            <a:ext cx="1619085" cy="830997"/>
+            <a:ext cx="1619085" cy="738664"/>
           </a:xfrm>
           <a:prstGeom prst="rect">
             <a:avLst/>
@@ -5830,15 +6009,27 @@
           <a:p>
             <a:pPr algn="ctr"/>
             <a:r>
-              <a:rPr lang="en-US" sz="1600" dirty="0" smtClean="0">
+              <a:rPr lang="en-US" sz="1400" dirty="0" smtClean="0">
                 <a:solidFill>
                   <a:schemeClr val="bg2"/>
                 </a:solidFill>
                 <a:latin typeface="Consolas" panose="020B0609020204030204" pitchFamily="49" charset="0"/>
               </a:rPr>
-              <a:t>Crowdsource a list of challenges</a:t>
-            </a:r>
-            <a:endParaRPr lang="en-CA" sz="1600" dirty="0">
+              <a:t>Crowdsource </a:t>
+            </a:r>
+          </a:p>
+          <a:p>
+            <a:pPr algn="ctr"/>
+            <a:r>
+              <a:rPr lang="en-US" sz="1400" dirty="0" smtClean="0">
+                <a:solidFill>
+                  <a:schemeClr val="bg2"/>
+                </a:solidFill>
+                <a:latin typeface="Consolas" panose="020B0609020204030204" pitchFamily="49" charset="0"/>
+              </a:rPr>
+              <a:t>a list of challenges</a:t>
+            </a:r>
+            <a:endParaRPr lang="en-CA" sz="1400" dirty="0">
               <a:solidFill>
                 <a:schemeClr val="bg2"/>
               </a:solidFill>
@@ -6481,7 +6672,7 @@
         </p:nvSpPr>
         <p:spPr>
           <a:xfrm>
-            <a:off x="6357130" y="3973849"/>
+            <a:off x="6366366" y="4001557"/>
             <a:ext cx="1924061" cy="738664"/>
           </a:xfrm>
           <a:prstGeom prst="rect">
@@ -6522,7 +6713,7 @@
         </p:nvSpPr>
         <p:spPr>
           <a:xfrm>
-            <a:off x="8126362" y="3978753"/>
+            <a:off x="8135598" y="4006461"/>
             <a:ext cx="1924061" cy="523220"/>
           </a:xfrm>
           <a:prstGeom prst="rect">
@@ -7023,6 +7214,13 @@
   <p:clrMapOvr>
     <a:masterClrMapping/>
   </p:clrMapOvr>
+  <p:timing>
+    <p:tnLst>
+      <p:par>
+        <p:cTn id="1" dur="indefinite" restart="never" nodeType="tmRoot"/>
+      </p:par>
+    </p:tnLst>
+  </p:timing>
 </p:sld>
 </file>
 
@@ -7096,7 +7294,7 @@
         </p:nvSpPr>
         <p:spPr>
           <a:xfrm>
-            <a:off x="800821" y="2704218"/>
+            <a:off x="800821" y="2778109"/>
             <a:ext cx="5865428" cy="1323439"/>
           </a:xfrm>
           <a:prstGeom prst="rect">
@@ -7130,7 +7328,7 @@
                 </a:solidFill>
                 <a:latin typeface="Consolas" panose="020B0609020204030204" pitchFamily="49" charset="0"/>
               </a:rPr>
-              <a:t>- Work in the open/transparency</a:t>
+              <a:t>- Work in the open</a:t>
             </a:r>
           </a:p>
           <a:p>
@@ -7179,7 +7377,7 @@
         </p:nvSpPr>
         <p:spPr>
           <a:xfrm>
-            <a:off x="6796848" y="2704218"/>
+            <a:off x="6796848" y="2778109"/>
             <a:ext cx="5124677" cy="1323439"/>
           </a:xfrm>
           <a:prstGeom prst="rect">
@@ -7217,7 +7415,7 @@
                 </a:solidFill>
                 <a:latin typeface="Consolas" panose="020B0609020204030204" pitchFamily="49" charset="0"/>
               </a:rPr>
-              <a:t>- Clear Partnership Agreements</a:t>
+              <a:t>- Clear partnership agreements</a:t>
             </a:r>
           </a:p>
           <a:p>
@@ -7321,6 +7519,13 @@
   <p:clrMapOvr>
     <a:masterClrMapping/>
   </p:clrMapOvr>
+  <p:timing>
+    <p:tnLst>
+      <p:par>
+        <p:cTn id="1" dur="indefinite" restart="never" nodeType="tmRoot"/>
+      </p:par>
+    </p:tnLst>
+  </p:timing>
 </p:sld>
 </file>
 
@@ -7349,8 +7554,8 @@
         </p:nvSpPr>
         <p:spPr>
           <a:xfrm>
-            <a:off x="0" y="2344783"/>
-            <a:ext cx="12192000" cy="2246811"/>
+            <a:off x="0" y="2289364"/>
+            <a:ext cx="12192000" cy="2532017"/>
           </a:xfrm>
           <a:prstGeom prst="rect">
             <a:avLst/>
@@ -7394,7 +7599,7 @@
         </p:nvSpPr>
         <p:spPr>
           <a:xfrm>
-            <a:off x="1246797" y="2291139"/>
+            <a:off x="1246797" y="2409437"/>
             <a:ext cx="9698405" cy="1938992"/>
           </a:xfrm>
           <a:prstGeom prst="rect">
@@ -7427,7 +7632,7 @@
                 </a:solidFill>
                 <a:latin typeface="Consolas" panose="020B0609020204030204" pitchFamily="49" charset="0"/>
               </a:rPr>
-              <a:t>Settle in. Onboard, learn </a:t>
+              <a:t>Settle in, onboard, learn </a:t>
             </a:r>
             <a:r>
               <a:rPr lang="en-US" sz="2000" dirty="0">
@@ -7566,7 +7771,7 @@
         </p:nvSpPr>
         <p:spPr>
           <a:xfrm>
-            <a:off x="0" y="1883118"/>
+            <a:off x="0" y="1827699"/>
             <a:ext cx="2563522" cy="461665"/>
           </a:xfrm>
           <a:prstGeom prst="rect">
@@ -7598,6 +7803,13 @@
   <p:clrMapOvr>
     <a:masterClrMapping/>
   </p:clrMapOvr>
+  <p:timing>
+    <p:tnLst>
+      <p:par>
+        <p:cTn id="1" dur="indefinite" restart="never" nodeType="tmRoot"/>
+      </p:par>
+    </p:tnLst>
+  </p:timing>
 </p:sld>
 </file>
 
@@ -7626,8 +7838,8 @@
         </p:nvSpPr>
         <p:spPr>
           <a:xfrm>
-            <a:off x="0" y="1959429"/>
-            <a:ext cx="12192000" cy="2632166"/>
+            <a:off x="0" y="1922484"/>
+            <a:ext cx="12192000" cy="3000498"/>
           </a:xfrm>
           <a:prstGeom prst="rect">
             <a:avLst/>
@@ -7671,7 +7883,7 @@
         </p:nvSpPr>
         <p:spPr>
           <a:xfrm>
-            <a:off x="1887517" y="2117848"/>
+            <a:off x="1874371" y="2299348"/>
             <a:ext cx="8443257" cy="2246769"/>
           </a:xfrm>
           <a:prstGeom prst="rect">
@@ -7726,13 +7938,22 @@
           <a:p>
             <a:pPr algn="just"/>
             <a:r>
+              <a:rPr lang="en-US" sz="2000" b="1" dirty="0" smtClean="0">
+                <a:solidFill>
+                  <a:schemeClr val="bg2"/>
+                </a:solidFill>
+                <a:latin typeface="Consolas" panose="020B0609020204030204" pitchFamily="49" charset="0"/>
+              </a:rPr>
+              <a:t>We need your problems</a:t>
+            </a:r>
+            <a:r>
               <a:rPr lang="en-US" sz="2000" dirty="0" smtClean="0">
                 <a:solidFill>
                   <a:schemeClr val="bg2"/>
                 </a:solidFill>
                 <a:latin typeface="Consolas" panose="020B0609020204030204" pitchFamily="49" charset="0"/>
               </a:rPr>
-              <a:t>We need your problems, your ideas, and your help to turn those ideas into missions.</a:t>
+              <a:t>, your ideas, and your help to turn those ideas into missions.</a:t>
             </a:r>
           </a:p>
           <a:p>
@@ -7781,7 +8002,7 @@
         </p:nvSpPr>
         <p:spPr>
           <a:xfrm>
-            <a:off x="0" y="1497764"/>
+            <a:off x="0" y="1460819"/>
             <a:ext cx="2563522" cy="461665"/>
           </a:xfrm>
           <a:prstGeom prst="rect">
@@ -7816,6 +8037,13 @@
   <p:clrMapOvr>
     <a:masterClrMapping/>
   </p:clrMapOvr>
+  <p:timing>
+    <p:tnLst>
+      <p:par>
+        <p:cTn id="1" dur="indefinite" restart="never" nodeType="tmRoot"/>
+      </p:par>
+    </p:tnLst>
+  </p:timing>
 </p:sld>
 </file>
 
@@ -7845,7 +8073,7 @@
         <p:spPr>
           <a:xfrm>
             <a:off x="0" y="2344783"/>
-            <a:ext cx="12192000" cy="2246811"/>
+            <a:ext cx="12192000" cy="2605908"/>
           </a:xfrm>
           <a:prstGeom prst="rect">
             <a:avLst/>
@@ -7922,7 +8150,7 @@
         </p:nvGrpSpPr>
         <p:grpSpPr>
           <a:xfrm>
-            <a:off x="2044378" y="2344783"/>
+            <a:off x="2102456" y="2492565"/>
             <a:ext cx="10089544" cy="1990288"/>
             <a:chOff x="2011721" y="2344783"/>
             <a:chExt cx="10089544" cy="1990288"/>
@@ -8366,6 +8594,13 @@
   <p:clrMapOvr>
     <a:masterClrMapping/>
   </p:clrMapOvr>
+  <p:timing>
+    <p:tnLst>
+      <p:par>
+        <p:cTn id="1" dur="indefinite" restart="never" nodeType="tmRoot"/>
+      </p:par>
+    </p:tnLst>
+  </p:timing>
 </p:sld>
 </file>
 

</xml_diff>

<commit_message>
Update GitHub org URL
</commit_message>
<xml_diff>
--- a/Digital Task Force - Introduction - long form.pptx
+++ b/Digital Task Force - Introduction - long form.pptx
@@ -256,7 +256,7 @@
           <a:p>
             <a:fld id="{CD5BB89E-FEB4-4681-8DB7-1A527A193235}" type="datetimeFigureOut">
               <a:rPr lang="en-CA" smtClean="0"/>
-              <a:t>2019-08-28</a:t>
+              <a:t>2019-09-13</a:t>
             </a:fld>
             <a:endParaRPr lang="en-CA"/>
           </a:p>
@@ -426,7 +426,7 @@
           <a:p>
             <a:fld id="{CD5BB89E-FEB4-4681-8DB7-1A527A193235}" type="datetimeFigureOut">
               <a:rPr lang="en-CA" smtClean="0"/>
-              <a:t>2019-08-28</a:t>
+              <a:t>2019-09-13</a:t>
             </a:fld>
             <a:endParaRPr lang="en-CA"/>
           </a:p>
@@ -606,7 +606,7 @@
           <a:p>
             <a:fld id="{CD5BB89E-FEB4-4681-8DB7-1A527A193235}" type="datetimeFigureOut">
               <a:rPr lang="en-CA" smtClean="0"/>
-              <a:t>2019-08-28</a:t>
+              <a:t>2019-09-13</a:t>
             </a:fld>
             <a:endParaRPr lang="en-CA"/>
           </a:p>
@@ -776,7 +776,7 @@
           <a:p>
             <a:fld id="{CD5BB89E-FEB4-4681-8DB7-1A527A193235}" type="datetimeFigureOut">
               <a:rPr lang="en-CA" smtClean="0"/>
-              <a:t>2019-08-28</a:t>
+              <a:t>2019-09-13</a:t>
             </a:fld>
             <a:endParaRPr lang="en-CA"/>
           </a:p>
@@ -1022,7 +1022,7 @@
           <a:p>
             <a:fld id="{CD5BB89E-FEB4-4681-8DB7-1A527A193235}" type="datetimeFigureOut">
               <a:rPr lang="en-CA" smtClean="0"/>
-              <a:t>2019-08-28</a:t>
+              <a:t>2019-09-13</a:t>
             </a:fld>
             <a:endParaRPr lang="en-CA"/>
           </a:p>
@@ -1254,7 +1254,7 @@
           <a:p>
             <a:fld id="{CD5BB89E-FEB4-4681-8DB7-1A527A193235}" type="datetimeFigureOut">
               <a:rPr lang="en-CA" smtClean="0"/>
-              <a:t>2019-08-28</a:t>
+              <a:t>2019-09-13</a:t>
             </a:fld>
             <a:endParaRPr lang="en-CA"/>
           </a:p>
@@ -1621,7 +1621,7 @@
           <a:p>
             <a:fld id="{CD5BB89E-FEB4-4681-8DB7-1A527A193235}" type="datetimeFigureOut">
               <a:rPr lang="en-CA" smtClean="0"/>
-              <a:t>2019-08-28</a:t>
+              <a:t>2019-09-13</a:t>
             </a:fld>
             <a:endParaRPr lang="en-CA"/>
           </a:p>
@@ -1739,7 +1739,7 @@
           <a:p>
             <a:fld id="{CD5BB89E-FEB4-4681-8DB7-1A527A193235}" type="datetimeFigureOut">
               <a:rPr lang="en-CA" smtClean="0"/>
-              <a:t>2019-08-28</a:t>
+              <a:t>2019-09-13</a:t>
             </a:fld>
             <a:endParaRPr lang="en-CA"/>
           </a:p>
@@ -1834,7 +1834,7 @@
           <a:p>
             <a:fld id="{CD5BB89E-FEB4-4681-8DB7-1A527A193235}" type="datetimeFigureOut">
               <a:rPr lang="en-CA" smtClean="0"/>
-              <a:t>2019-08-28</a:t>
+              <a:t>2019-09-13</a:t>
             </a:fld>
             <a:endParaRPr lang="en-CA"/>
           </a:p>
@@ -2111,7 +2111,7 @@
           <a:p>
             <a:fld id="{CD5BB89E-FEB4-4681-8DB7-1A527A193235}" type="datetimeFigureOut">
               <a:rPr lang="en-CA" smtClean="0"/>
-              <a:t>2019-08-28</a:t>
+              <a:t>2019-09-13</a:t>
             </a:fld>
             <a:endParaRPr lang="en-CA"/>
           </a:p>
@@ -2364,7 +2364,7 @@
           <a:p>
             <a:fld id="{CD5BB89E-FEB4-4681-8DB7-1A527A193235}" type="datetimeFigureOut">
               <a:rPr lang="en-CA" smtClean="0"/>
-              <a:t>2019-08-28</a:t>
+              <a:t>2019-09-13</a:t>
             </a:fld>
             <a:endParaRPr lang="en-CA"/>
           </a:p>
@@ -2577,7 +2577,7 @@
           <a:p>
             <a:fld id="{CD5BB89E-FEB4-4681-8DB7-1A527A193235}" type="datetimeFigureOut">
               <a:rPr lang="en-CA" smtClean="0"/>
-              <a:t>2019-08-28</a:t>
+              <a:t>2019-09-13</a:t>
             </a:fld>
             <a:endParaRPr lang="en-CA"/>
           </a:p>
@@ -4641,10 +4641,10 @@
                 </a:solidFill>
                 <a:latin typeface="Consolas" panose="020B0609020204030204" pitchFamily="49" charset="0"/>
               </a:rPr>
-              <a:t>- github.com/SSC-CIO-</a:t>
-            </a:r>
-            <a:r>
-              <a:rPr lang="en-CA" sz="1400" dirty="0" err="1" smtClean="0">
+              <a:t>- </a:t>
+            </a:r>
+            <a:r>
+              <a:rPr lang="en-CA" sz="1400" dirty="0" smtClean="0">
                 <a:solidFill>
                   <a:schemeClr val="tx1">
                     <a:lumMod val="95000"/>
@@ -4653,7 +4653,19 @@
                 </a:solidFill>
                 <a:latin typeface="Consolas" panose="020B0609020204030204" pitchFamily="49" charset="0"/>
               </a:rPr>
-              <a:t>DigitalTaskForce</a:t>
+              <a:t>github.com/dtf-</a:t>
+            </a:r>
+            <a:r>
+              <a:rPr lang="en-CA" sz="1400" dirty="0" err="1" smtClean="0">
+                <a:solidFill>
+                  <a:schemeClr val="tx1">
+                    <a:lumMod val="95000"/>
+                    <a:lumOff val="5000"/>
+                  </a:schemeClr>
+                </a:solidFill>
+                <a:latin typeface="Consolas" panose="020B0609020204030204" pitchFamily="49" charset="0"/>
+              </a:rPr>
+              <a:t>ein</a:t>
             </a:r>
             <a:endParaRPr lang="en-CA" sz="1400" dirty="0" smtClean="0">
               <a:solidFill>
@@ -8226,7 +8238,7 @@
                   </a:solidFill>
                   <a:latin typeface="Consolas" panose="020B0609020204030204" pitchFamily="49" charset="0"/>
                 </a:rPr>
-                <a:t>github.com/SSC-CIO-</a:t>
+                <a:t>github.com/dtf-</a:t>
               </a:r>
               <a:r>
                 <a:rPr lang="en-CA" sz="2000" dirty="0" err="1" smtClean="0">
@@ -8235,7 +8247,7 @@
                   </a:solidFill>
                   <a:latin typeface="Consolas" panose="020B0609020204030204" pitchFamily="49" charset="0"/>
                 </a:rPr>
-                <a:t>DigitalTaskForce</a:t>
+                <a:t>ein</a:t>
               </a:r>
               <a:endParaRPr lang="en-CA" sz="2000" dirty="0">
                 <a:solidFill>
@@ -8606,7 +8618,7 @@
 
 <file path=ppt/tags/tag1.xml><?xml version="1.0" encoding="utf-8"?>
 <p:tagLst xmlns:a="http://schemas.openxmlformats.org/drawingml/2006/main" xmlns:r="http://schemas.openxmlformats.org/officeDocument/2006/relationships" xmlns:p="http://schemas.openxmlformats.org/presentationml/2006/main">
-  <p:tag name="ENGAGE" val="{&quot;SavedSwatch&quot;:&quot;-11579311|-10846711|-14797230|-8244963|-11249614|PSPC&quot;,&quot;Id&quot;:&quot;5d64385d30303426cc9a71a7&quot;,&quot;SmartGridHorizontal&quot;:0,&quot;LinkedExcelSources&quot;:{},&quot;LinkedProjectSources&quot;:{},&quot;FlowConfig&quot;:{&quot;Canvas&quot;:{&quot;Slide&quot;:-1,&quot;Width&quot;:0,&quot;Height&quot;:0},&quot;Timeline&quot;:{&quot;Actions&quot;:[]}},&quot;LinkedSlideMergeSources&quot;:{},&quot;LinkedSharePointSlideMergeSources&quot;:{}}"/>
+  <p:tag name="ENGAGE" val="{&quot;SavedSwatch&quot;:&quot;-11579311|-10846711|-14797230|-8244963|-11249614|PSPC&quot;,&quot;Id&quot;:&quot;5d7bd6ac4331434bc0c5002d&quot;,&quot;SmartGridHorizontal&quot;:0,&quot;LinkedExcelSources&quot;:{},&quot;LinkedProjectSources&quot;:{},&quot;FlowConfig&quot;:{&quot;Canvas&quot;:{&quot;Slide&quot;:-1,&quot;Width&quot;:0,&quot;Height&quot;:0},&quot;Timeline&quot;:{&quot;Actions&quot;:[]}},&quot;LinkedSlideMergeSources&quot;:{},&quot;LinkedSharePointSlideMergeSources&quot;:{}}"/>
 </p:tagLst>
 </file>
 

</xml_diff>